<commit_message>
dodana wizualizacja predykcji na danych testowych
</commit_message>
<xml_diff>
--- a/projekt_dl/SIGN LANGAUGE MNIST.pptx
+++ b/projekt_dl/SIGN LANGAUGE MNIST.pptx
@@ -18,9 +18,10 @@
     <p:sldId id="269" r:id="rId12"/>
     <p:sldId id="265" r:id="rId13"/>
     <p:sldId id="267" r:id="rId14"/>
-    <p:sldId id="266" r:id="rId15"/>
-    <p:sldId id="268" r:id="rId16"/>
-    <p:sldId id="271" r:id="rId17"/>
+    <p:sldId id="272" r:id="rId15"/>
+    <p:sldId id="266" r:id="rId16"/>
+    <p:sldId id="268" r:id="rId17"/>
+    <p:sldId id="271" r:id="rId18"/>
   </p:sldIdLst>
   <p:sldSz cx="12192000" cy="6858000"/>
   <p:notesSz cx="6858000" cy="9144000"/>
@@ -3570,13 +3571,6 @@
   <p:clrMapOvr>
     <a:masterClrMapping/>
   </p:clrMapOvr>
-  <p:timing>
-    <p:tnLst>
-      <p:par>
-        <p:cTn id="1" dur="indefinite" restart="never" nodeType="tmRoot"/>
-      </p:par>
-    </p:tnLst>
-  </p:timing>
 </p:sld>
 </file>
 
@@ -3970,15 +3964,17 @@
           </a:solidFill>
         </p:spPr>
         <p:txBody>
-          <a:bodyPr/>
+          <a:bodyPr>
+            <a:normAutofit/>
+          </a:bodyPr>
           <a:lstStyle/>
           <a:p>
             <a:pPr algn="ctr"/>
             <a:r>
-              <a:rPr lang="pl-PL" dirty="0">
+              <a:rPr lang="pl-PL" sz="2800" dirty="0">
                 <a:latin typeface="Libre Franklin" pitchFamily="2" charset="-18"/>
               </a:rPr>
-              <a:t>CONFUSION MATRIX</a:t>
+              <a:t>PREDYKCJA MODELU -CONFUSION MATRIX</a:t>
             </a:r>
           </a:p>
         </p:txBody>
@@ -4047,6 +4043,110 @@
           <p:cNvPr id="2" name="Tytuł 1">
             <a:extLst>
               <a:ext uri="{FF2B5EF4-FFF2-40B4-BE49-F238E27FC236}">
+                <a16:creationId xmlns:a16="http://schemas.microsoft.com/office/drawing/2014/main" id="{11F61B20-8CE4-B248-890B-905D01D6CFA9}"/>
+              </a:ext>
+            </a:extLst>
+          </p:cNvPr>
+          <p:cNvSpPr>
+            <a:spLocks noGrp="1"/>
+          </p:cNvSpPr>
+          <p:nvPr>
+            <p:ph type="title"/>
+          </p:nvPr>
+        </p:nvSpPr>
+        <p:spPr>
+          <a:xfrm>
+            <a:off x="838200" y="365126"/>
+            <a:ext cx="10515600" cy="692149"/>
+          </a:xfrm>
+          <a:solidFill>
+            <a:schemeClr val="accent2">
+              <a:lumMod val="40000"/>
+              <a:lumOff val="60000"/>
+            </a:schemeClr>
+          </a:solidFill>
+        </p:spPr>
+        <p:txBody>
+          <a:bodyPr>
+            <a:normAutofit/>
+          </a:bodyPr>
+          <a:lstStyle/>
+          <a:p>
+            <a:pPr algn="ctr"/>
+            <a:r>
+              <a:rPr lang="pl-PL" sz="3200" dirty="0">
+                <a:latin typeface="Libre Franklin" pitchFamily="2" charset="-18"/>
+              </a:rPr>
+              <a:t>PREDYKCJA MODELU - WIZUALIZACJA</a:t>
+            </a:r>
+          </a:p>
+        </p:txBody>
+      </p:sp>
+      <p:pic>
+        <p:nvPicPr>
+          <p:cNvPr id="5" name="Obraz 4">
+            <a:extLst>
+              <a:ext uri="{FF2B5EF4-FFF2-40B4-BE49-F238E27FC236}">
+                <a16:creationId xmlns:a16="http://schemas.microsoft.com/office/drawing/2014/main" id="{2FD2655C-88B1-46C0-7AC7-F6157BA645BA}"/>
+              </a:ext>
+            </a:extLst>
+          </p:cNvPr>
+          <p:cNvPicPr>
+            <a:picLocks noChangeAspect="1"/>
+          </p:cNvPicPr>
+          <p:nvPr/>
+        </p:nvPicPr>
+        <p:blipFill>
+          <a:blip r:embed="rId2"/>
+          <a:stretch>
+            <a:fillRect/>
+          </a:stretch>
+        </p:blipFill>
+        <p:spPr>
+          <a:xfrm>
+            <a:off x="2581275" y="1285875"/>
+            <a:ext cx="6420329" cy="5415425"/>
+          </a:xfrm>
+          <a:prstGeom prst="rect">
+            <a:avLst/>
+          </a:prstGeom>
+        </p:spPr>
+      </p:pic>
+    </p:spTree>
+    <p:extLst>
+      <p:ext uri="{BB962C8B-B14F-4D97-AF65-F5344CB8AC3E}">
+        <p14:creationId xmlns:p14="http://schemas.microsoft.com/office/powerpoint/2010/main" val="96361742"/>
+      </p:ext>
+    </p:extLst>
+  </p:cSld>
+  <p:clrMapOvr>
+    <a:masterClrMapping/>
+  </p:clrMapOvr>
+</p:sld>
+</file>
+
+<file path=ppt/slides/slide15.xml><?xml version="1.0" encoding="utf-8"?>
+<p:sld xmlns:a="http://schemas.openxmlformats.org/drawingml/2006/main" xmlns:r="http://schemas.openxmlformats.org/officeDocument/2006/relationships" xmlns:p="http://schemas.openxmlformats.org/presentationml/2006/main">
+  <p:cSld>
+    <p:spTree>
+      <p:nvGrpSpPr>
+        <p:cNvPr id="1" name=""/>
+        <p:cNvGrpSpPr/>
+        <p:nvPr/>
+      </p:nvGrpSpPr>
+      <p:grpSpPr>
+        <a:xfrm>
+          <a:off x="0" y="0"/>
+          <a:ext cx="0" cy="0"/>
+          <a:chOff x="0" y="0"/>
+          <a:chExt cx="0" cy="0"/>
+        </a:xfrm>
+      </p:grpSpPr>
+      <p:sp>
+        <p:nvSpPr>
+          <p:cNvPr id="2" name="Tytuł 1">
+            <a:extLst>
+              <a:ext uri="{FF2B5EF4-FFF2-40B4-BE49-F238E27FC236}">
                 <a16:creationId xmlns:a16="http://schemas.microsoft.com/office/drawing/2014/main" id="{2DD32195-5437-0A1C-8200-4AE4C193C4C3}"/>
               </a:ext>
             </a:extLst>
@@ -4163,7 +4263,7 @@
 </p:sld>
 </file>
 
-<file path=ppt/slides/slide15.xml><?xml version="1.0" encoding="utf-8"?>
+<file path=ppt/slides/slide16.xml><?xml version="1.0" encoding="utf-8"?>
 <p:sld xmlns:a="http://schemas.openxmlformats.org/drawingml/2006/main" xmlns:r="http://schemas.openxmlformats.org/officeDocument/2006/relationships" xmlns:p="http://schemas.openxmlformats.org/presentationml/2006/main">
   <p:cSld>
     <p:spTree>
@@ -4264,9 +4364,17 @@
 </p:sld>
 </file>
 
-<file path=ppt/slides/slide16.xml><?xml version="1.0" encoding="utf-8"?>
+<file path=ppt/slides/slide17.xml><?xml version="1.0" encoding="utf-8"?>
 <p:sld xmlns:a="http://schemas.openxmlformats.org/drawingml/2006/main" xmlns:r="http://schemas.openxmlformats.org/officeDocument/2006/relationships" xmlns:p="http://schemas.openxmlformats.org/presentationml/2006/main">
   <p:cSld>
+    <p:bg>
+      <p:bgPr>
+        <a:solidFill>
+          <a:schemeClr val="bg1"/>
+        </a:solidFill>
+        <a:effectLst/>
+      </p:bgPr>
+    </p:bg>
     <p:spTree>
       <p:nvGrpSpPr>
         <p:cNvPr id="1" name=""/>
@@ -4309,14 +4417,13 @@
           <a:p>
             <a:pPr algn="r"/>
             <a:r>
-              <a:rPr lang="pl-PL" b="1" i="1" dirty="0" smtClean="0"/>
-              <a:t>Dziękujemy</a:t>
-            </a:r>
-            <a:r>
-              <a:rPr lang="pl-PL" dirty="0" smtClean="0"/>
+              <a:rPr lang="pl-PL" b="1" i="1" dirty="0"/>
+              <a:t>Dziękujemy   </a:t>
+            </a:r>
+            <a:r>
+              <a:rPr lang="pl-PL" dirty="0"/>
               <a:t> </a:t>
             </a:r>
-            <a:endParaRPr lang="pl-PL" dirty="0"/>
           </a:p>
         </p:txBody>
       </p:sp>
@@ -4447,6 +4554,7 @@
           </a:bodyPr>
           <a:lstStyle/>
           <a:p>
+            <a:pPr algn="just"/>
             <a:r>
               <a:rPr lang="pl-PL" dirty="0">
                 <a:solidFill>
@@ -4472,6 +4580,7 @@
             </a:endParaRPr>
           </a:p>
           <a:p>
+            <a:pPr algn="just"/>
             <a:r>
               <a:rPr lang="pl-PL" b="0" i="0" dirty="0">
                 <a:solidFill>
@@ -4484,6 +4593,7 @@
             </a:r>
           </a:p>
           <a:p>
+            <a:pPr algn="just"/>
             <a:r>
               <a:rPr lang="pl-PL" b="0" i="0" dirty="0">
                 <a:solidFill>
@@ -4502,6 +4612,7 @@
             </a:endParaRPr>
           </a:p>
           <a:p>
+            <a:pPr algn="just"/>
             <a:r>
               <a:rPr lang="pl-PL" b="0" i="0" dirty="0">
                 <a:solidFill>
@@ -4528,13 +4639,6 @@
   <p:clrMapOvr>
     <a:masterClrMapping/>
   </p:clrMapOvr>
-  <p:timing>
-    <p:tnLst>
-      <p:par>
-        <p:cTn id="1" dur="indefinite" restart="never" nodeType="tmRoot"/>
-      </p:par>
-    </p:tnLst>
-  </p:timing>
 </p:sld>
 </file>
 
@@ -4620,6 +4724,7 @@
           <a:bodyPr/>
           <a:lstStyle/>
           <a:p>
+            <a:pPr algn="just"/>
             <a:r>
               <a:rPr lang="pl-PL" b="0" i="0" dirty="0">
                 <a:effectLst/>
@@ -4629,6 +4734,7 @@
             </a:r>
           </a:p>
           <a:p>
+            <a:pPr algn="just"/>
             <a:r>
               <a:rPr lang="pl-PL" b="0" i="0" dirty="0">
                 <a:effectLst/>
@@ -4638,6 +4744,7 @@
             </a:r>
           </a:p>
           <a:p>
+            <a:pPr algn="just"/>
             <a:r>
               <a:rPr lang="pl-PL" b="0" i="0" dirty="0">
                 <a:effectLst/>
@@ -4650,6 +4757,7 @@
             </a:endParaRPr>
           </a:p>
           <a:p>
+            <a:pPr algn="just"/>
             <a:r>
               <a:rPr lang="pl-PL" b="0" i="0" dirty="0">
                 <a:effectLst/>
@@ -4659,6 +4767,7 @@
             </a:r>
           </a:p>
           <a:p>
+            <a:pPr algn="just"/>
             <a:r>
               <a:rPr lang="pl-PL" dirty="0">
                 <a:latin typeface="Libre Franklin" pitchFamily="2" charset="-18"/>
@@ -4685,13 +4794,6 @@
   <p:clrMapOvr>
     <a:masterClrMapping/>
   </p:clrMapOvr>
-  <p:timing>
-    <p:tnLst>
-      <p:par>
-        <p:cTn id="1" dur="indefinite" restart="never" nodeType="tmRoot"/>
-      </p:par>
-    </p:tnLst>
-  </p:timing>
 </p:sld>
 </file>
 
@@ -4779,6 +4881,7 @@
           </a:bodyPr>
           <a:lstStyle/>
           <a:p>
+            <a:pPr algn="just"/>
             <a:r>
               <a:rPr lang="pl-PL" dirty="0">
                 <a:latin typeface="Libre Franklin" pitchFamily="2" charset="-18"/>
@@ -4787,7 +4890,7 @@
             </a:r>
           </a:p>
           <a:p>
-            <a:pPr marL="0" indent="0">
+            <a:pPr marL="0" indent="0" algn="just">
               <a:buNone/>
             </a:pPr>
             <a:endParaRPr lang="pl-PL" dirty="0">
@@ -4795,6 +4898,7 @@
             </a:endParaRPr>
           </a:p>
           <a:p>
+            <a:pPr algn="just"/>
             <a:r>
               <a:rPr lang="pl-PL" dirty="0">
                 <a:latin typeface="Libre Franklin" pitchFamily="2" charset="-18"/>
@@ -4815,11 +4919,13 @@
             </a:r>
           </a:p>
           <a:p>
+            <a:pPr algn="just"/>
             <a:endParaRPr lang="pl-PL" dirty="0">
               <a:latin typeface="Libre Franklin" pitchFamily="2" charset="-18"/>
             </a:endParaRPr>
           </a:p>
           <a:p>
+            <a:pPr algn="just"/>
             <a:r>
               <a:rPr lang="pl-PL" dirty="0">
                 <a:latin typeface="Libre Franklin" pitchFamily="2" charset="-18"/>
@@ -4839,13 +4945,6 @@
   <p:clrMapOvr>
     <a:masterClrMapping/>
   </p:clrMapOvr>
-  <p:timing>
-    <p:tnLst>
-      <p:par>
-        <p:cTn id="1" dur="indefinite" restart="never" nodeType="tmRoot"/>
-      </p:par>
-    </p:tnLst>
-  </p:timing>
 </p:sld>
 </file>
 
@@ -5026,13 +5125,6 @@
   <p:clrMapOvr>
     <a:masterClrMapping/>
   </p:clrMapOvr>
-  <p:timing>
-    <p:tnLst>
-      <p:par>
-        <p:cTn id="1" dur="indefinite" restart="never" nodeType="tmRoot"/>
-      </p:par>
-    </p:tnLst>
-  </p:timing>
 </p:sld>
 </file>
 
@@ -5396,13 +5488,6 @@
   <p:clrMapOvr>
     <a:masterClrMapping/>
   </p:clrMapOvr>
-  <p:timing>
-    <p:tnLst>
-      <p:par>
-        <p:cTn id="1" dur="indefinite" restart="never" nodeType="tmRoot"/>
-      </p:par>
-    </p:tnLst>
-  </p:timing>
 </p:sld>
 </file>
 
@@ -5607,38 +5692,37 @@
               <a:t>   - </a:t>
             </a:r>
             <a:r>
-              <a:rPr lang="pl-PL" sz="2400" dirty="0" err="1" smtClean="0"/>
+              <a:rPr lang="pl-PL" sz="2400" dirty="0" err="1"/>
               <a:t>callbacks</a:t>
             </a:r>
             <a:r>
-              <a:rPr lang="pl-PL" sz="2400" dirty="0" smtClean="0"/>
+              <a:rPr lang="pl-PL" sz="2400" dirty="0"/>
               <a:t> (</a:t>
             </a:r>
             <a:r>
-              <a:rPr lang="pl-PL" sz="1800" dirty="0" err="1" smtClean="0"/>
+              <a:rPr lang="pl-PL" sz="1800" dirty="0" err="1"/>
               <a:t>EarlyStopping</a:t>
             </a:r>
             <a:r>
-              <a:rPr lang="pl-PL" sz="1800" dirty="0" smtClean="0"/>
+              <a:rPr lang="pl-PL" sz="1800" dirty="0"/>
               <a:t> – </a:t>
             </a:r>
             <a:r>
-              <a:rPr lang="pl-PL" sz="1800" dirty="0" err="1" smtClean="0"/>
+              <a:rPr lang="pl-PL" sz="1800" dirty="0" err="1"/>
               <a:t>patience</a:t>
             </a:r>
             <a:r>
-              <a:rPr lang="pl-PL" sz="1800" dirty="0" smtClean="0"/>
+              <a:rPr lang="pl-PL" sz="1800" dirty="0"/>
               <a:t> =10, </a:t>
             </a:r>
             <a:r>
-              <a:rPr lang="pl-PL" sz="1800" dirty="0" err="1" smtClean="0"/>
+              <a:rPr lang="pl-PL" sz="1800" dirty="0" err="1"/>
               <a:t>ReduceLROnPlateau</a:t>
             </a:r>
             <a:r>
-              <a:rPr lang="pl-PL" dirty="0" smtClean="0"/>
+              <a:rPr lang="pl-PL" dirty="0"/>
               <a:t>)</a:t>
             </a:r>
-            <a:endParaRPr lang="pl-PL" dirty="0"/>
           </a:p>
           <a:p>
             <a:pPr marL="0" indent="0">
@@ -5670,13 +5754,6 @@
   <p:clrMapOvr>
     <a:masterClrMapping/>
   </p:clrMapOvr>
-  <p:timing>
-    <p:tnLst>
-      <p:par>
-        <p:cTn id="1" dur="indefinite" restart="never" nodeType="tmRoot"/>
-      </p:par>
-    </p:tnLst>
-  </p:timing>
 </p:sld>
 </file>
 
@@ -5727,14 +5804,11 @@
           <a:p>
             <a:pPr algn="ctr"/>
             <a:r>
-              <a:rPr lang="pl-PL" sz="3600" dirty="0" smtClean="0">
+              <a:rPr lang="pl-PL" sz="3600" dirty="0">
                 <a:latin typeface="Libre Franklin"/>
               </a:rPr>
               <a:t>PORÓWNANIE MODELI</a:t>
             </a:r>
-            <a:endParaRPr lang="pl-PL" sz="3600" dirty="0">
-              <a:latin typeface="Libre Franklin"/>
-            </a:endParaRPr>
           </a:p>
         </p:txBody>
       </p:sp>
@@ -5800,10 +5874,9 @@
                     <a:lstStyle/>
                     <a:p>
                       <a:r>
-                        <a:rPr lang="pl-PL" dirty="0" smtClean="0"/>
+                        <a:rPr lang="pl-PL" dirty="0"/>
                         <a:t>Model</a:t>
                       </a:r>
-                      <a:endParaRPr lang="pl-PL" dirty="0"/>
                     </a:p>
                   </a:txBody>
                   <a:tcPr/>
@@ -5814,7 +5887,7 @@
                     <a:lstStyle/>
                     <a:p>
                       <a:r>
-                        <a:rPr lang="pl-PL" dirty="0" err="1" smtClean="0"/>
+                        <a:rPr lang="pl-PL" dirty="0" err="1"/>
                         <a:t>Accuracy</a:t>
                       </a:r>
                       <a:endParaRPr lang="pl-PL" dirty="0"/>
@@ -5828,10 +5901,9 @@
                     <a:lstStyle/>
                     <a:p>
                       <a:r>
-                        <a:rPr lang="pl-PL" dirty="0" smtClean="0"/>
+                        <a:rPr lang="pl-PL" dirty="0"/>
                         <a:t>Liczba warstw</a:t>
                       </a:r>
-                      <a:endParaRPr lang="pl-PL" dirty="0"/>
                     </a:p>
                   </a:txBody>
                   <a:tcPr/>
@@ -5842,10 +5914,9 @@
                     <a:lstStyle/>
                     <a:p>
                       <a:r>
-                        <a:rPr lang="pl-PL" dirty="0" smtClean="0"/>
+                        <a:rPr lang="pl-PL" dirty="0"/>
                         <a:t>Zastosowano dodatkowo</a:t>
                       </a:r>
-                      <a:endParaRPr lang="pl-PL" dirty="0"/>
                     </a:p>
                   </a:txBody>
                   <a:tcPr/>
@@ -5863,10 +5934,9 @@
                     <a:lstStyle/>
                     <a:p>
                       <a:r>
-                        <a:rPr lang="pl-PL" dirty="0" smtClean="0"/>
+                        <a:rPr lang="pl-PL" dirty="0"/>
                         <a:t>Model_1</a:t>
                       </a:r>
-                      <a:endParaRPr lang="pl-PL" dirty="0"/>
                     </a:p>
                   </a:txBody>
                   <a:tcPr/>
@@ -5877,10 +5947,9 @@
                     <a:lstStyle/>
                     <a:p>
                       <a:r>
-                        <a:rPr lang="pl-PL" dirty="0" smtClean="0"/>
+                        <a:rPr lang="pl-PL" dirty="0"/>
                         <a:t>0,8658</a:t>
                       </a:r>
-                      <a:endParaRPr lang="pl-PL" dirty="0"/>
                     </a:p>
                   </a:txBody>
                   <a:tcPr/>
@@ -5891,10 +5960,9 @@
                     <a:lstStyle/>
                     <a:p>
                       <a:r>
-                        <a:rPr lang="pl-PL" dirty="0" smtClean="0"/>
+                        <a:rPr lang="pl-PL" dirty="0"/>
                         <a:t>9</a:t>
                       </a:r>
-                      <a:endParaRPr lang="pl-PL" dirty="0"/>
                     </a:p>
                   </a:txBody>
                   <a:tcPr/>
@@ -5922,10 +5990,9 @@
                     <a:lstStyle/>
                     <a:p>
                       <a:r>
-                        <a:rPr lang="pl-PL" dirty="0" smtClean="0"/>
+                        <a:rPr lang="pl-PL" dirty="0"/>
                         <a:t>Model_2</a:t>
                       </a:r>
-                      <a:endParaRPr lang="pl-PL" dirty="0"/>
                     </a:p>
                   </a:txBody>
                   <a:tcPr/>
@@ -5936,10 +6003,9 @@
                     <a:lstStyle/>
                     <a:p>
                       <a:r>
-                        <a:rPr lang="pl-PL" dirty="0" smtClean="0"/>
+                        <a:rPr lang="pl-PL" dirty="0"/>
                         <a:t>0,9464</a:t>
                       </a:r>
-                      <a:endParaRPr lang="pl-PL" dirty="0"/>
                     </a:p>
                   </a:txBody>
                   <a:tcPr/>
@@ -5950,10 +6016,9 @@
                     <a:lstStyle/>
                     <a:p>
                       <a:r>
-                        <a:rPr lang="pl-PL" dirty="0" smtClean="0"/>
+                        <a:rPr lang="pl-PL" dirty="0"/>
                         <a:t>10</a:t>
                       </a:r>
-                      <a:endParaRPr lang="pl-PL" dirty="0"/>
                     </a:p>
                   </a:txBody>
                   <a:tcPr/>
@@ -5981,10 +6046,9 @@
                     <a:lstStyle/>
                     <a:p>
                       <a:r>
-                        <a:rPr lang="pl-PL" dirty="0" smtClean="0"/>
+                        <a:rPr lang="pl-PL" dirty="0"/>
                         <a:t>Model_3</a:t>
                       </a:r>
-                      <a:endParaRPr lang="pl-PL" dirty="0"/>
                     </a:p>
                   </a:txBody>
                   <a:tcPr/>
@@ -5995,10 +6059,9 @@
                     <a:lstStyle/>
                     <a:p>
                       <a:r>
-                        <a:rPr lang="pl-PL" dirty="0" smtClean="0"/>
+                        <a:rPr lang="pl-PL" dirty="0"/>
                         <a:t>0,8626</a:t>
                       </a:r>
-                      <a:endParaRPr lang="pl-PL" dirty="0"/>
                     </a:p>
                   </a:txBody>
                   <a:tcPr/>
@@ -6009,10 +6072,9 @@
                     <a:lstStyle/>
                     <a:p>
                       <a:r>
-                        <a:rPr lang="pl-PL" dirty="0" smtClean="0"/>
+                        <a:rPr lang="pl-PL" dirty="0"/>
                         <a:t>13</a:t>
                       </a:r>
-                      <a:endParaRPr lang="pl-PL" dirty="0"/>
                     </a:p>
                   </a:txBody>
                   <a:tcPr/>
@@ -6040,15 +6102,15 @@
                         <a:defRPr/>
                       </a:pPr>
                       <a:r>
-                        <a:rPr lang="pl-PL" dirty="0" err="1" smtClean="0"/>
+                        <a:rPr lang="pl-PL" dirty="0" err="1"/>
                         <a:t>Dropout</a:t>
                       </a:r>
                       <a:r>
-                        <a:rPr lang="pl-PL" dirty="0" smtClean="0"/>
+                        <a:rPr lang="pl-PL" dirty="0"/>
                         <a:t>, </a:t>
                       </a:r>
                       <a:r>
-                        <a:rPr lang="pl-PL" sz="1800" b="0" i="0" kern="1200" dirty="0" err="1" smtClean="0">
+                        <a:rPr lang="pl-PL" sz="1800" b="0" i="0" kern="1200" dirty="0" err="1">
                           <a:solidFill>
                             <a:schemeClr val="dk1"/>
                           </a:solidFill>
@@ -6059,7 +6121,7 @@
                         </a:rPr>
                         <a:t>BatchNormalization</a:t>
                       </a:r>
-                      <a:endParaRPr lang="pl-PL" sz="1800" b="0" i="0" kern="1200" dirty="0" smtClean="0">
+                      <a:endParaRPr lang="pl-PL" sz="1800" b="0" i="0" kern="1200" dirty="0">
                         <a:solidFill>
                           <a:schemeClr val="dk1"/>
                         </a:solidFill>
@@ -6085,10 +6147,9 @@
                     <a:lstStyle/>
                     <a:p>
                       <a:r>
-                        <a:rPr lang="pl-PL" dirty="0" smtClean="0"/>
+                        <a:rPr lang="pl-PL" dirty="0"/>
                         <a:t>Model_4</a:t>
                       </a:r>
-                      <a:endParaRPr lang="pl-PL" dirty="0"/>
                     </a:p>
                   </a:txBody>
                   <a:tcPr/>
@@ -6099,10 +6160,9 @@
                     <a:lstStyle/>
                     <a:p>
                       <a:r>
-                        <a:rPr lang="pl-PL" dirty="0" smtClean="0"/>
+                        <a:rPr lang="pl-PL" dirty="0"/>
                         <a:t>0,9675</a:t>
                       </a:r>
-                      <a:endParaRPr lang="pl-PL" dirty="0"/>
                     </a:p>
                   </a:txBody>
                   <a:tcPr/>
@@ -6113,10 +6173,9 @@
                     <a:lstStyle/>
                     <a:p>
                       <a:r>
-                        <a:rPr lang="pl-PL" dirty="0" smtClean="0"/>
+                        <a:rPr lang="pl-PL" dirty="0"/>
                         <a:t>13</a:t>
                       </a:r>
-                      <a:endParaRPr lang="pl-PL" dirty="0"/>
                     </a:p>
                   </a:txBody>
                   <a:tcPr/>
@@ -6144,15 +6203,15 @@
                         <a:defRPr/>
                       </a:pPr>
                       <a:r>
-                        <a:rPr lang="pl-PL" dirty="0" err="1" smtClean="0"/>
+                        <a:rPr lang="pl-PL" dirty="0" err="1"/>
                         <a:t>Dropout</a:t>
                       </a:r>
                       <a:r>
-                        <a:rPr lang="pl-PL" dirty="0" smtClean="0"/>
+                        <a:rPr lang="pl-PL" dirty="0"/>
                         <a:t>, </a:t>
                       </a:r>
                       <a:r>
-                        <a:rPr lang="pl-PL" sz="1800" b="0" i="0" kern="1200" dirty="0" err="1" smtClean="0">
+                        <a:rPr lang="pl-PL" sz="1800" b="0" i="0" kern="1200" dirty="0" err="1">
                           <a:solidFill>
                             <a:schemeClr val="dk1"/>
                           </a:solidFill>
@@ -6164,7 +6223,7 @@
                         <a:t>BatchNormalization</a:t>
                       </a:r>
                       <a:r>
-                        <a:rPr lang="pl-PL" sz="1800" b="0" i="0" kern="1200" dirty="0" smtClean="0">
+                        <a:rPr lang="pl-PL" sz="1800" b="0" i="0" kern="1200" dirty="0">
                           <a:solidFill>
                             <a:schemeClr val="dk1"/>
                           </a:solidFill>
@@ -6176,7 +6235,7 @@
                         <a:t>,</a:t>
                       </a:r>
                       <a:r>
-                        <a:rPr lang="pl-PL" sz="1800" b="0" i="0" kern="1200" baseline="0" dirty="0" smtClean="0">
+                        <a:rPr lang="pl-PL" sz="1800" b="0" i="0" kern="1200" baseline="0" dirty="0">
                           <a:solidFill>
                             <a:schemeClr val="dk1"/>
                           </a:solidFill>
@@ -6188,7 +6247,7 @@
                         <a:t> </a:t>
                       </a:r>
                       <a:r>
-                        <a:rPr lang="pl-PL" sz="1800" b="0" i="0" kern="1200" baseline="0" dirty="0" err="1" smtClean="0">
+                        <a:rPr lang="pl-PL" sz="1800" b="0" i="0" kern="1200" baseline="0" dirty="0" err="1">
                           <a:solidFill>
                             <a:schemeClr val="dk1"/>
                           </a:solidFill>
@@ -6200,7 +6259,7 @@
                         <a:t>Callbacks</a:t>
                       </a:r>
                       <a:r>
-                        <a:rPr lang="pl-PL" sz="1800" b="0" i="0" kern="1200" baseline="0" dirty="0" smtClean="0">
+                        <a:rPr lang="pl-PL" sz="1800" b="0" i="0" kern="1200" baseline="0" dirty="0">
                           <a:solidFill>
                             <a:schemeClr val="dk1"/>
                           </a:solidFill>
@@ -6212,7 +6271,7 @@
                         <a:t> (</a:t>
                       </a:r>
                       <a:r>
-                        <a:rPr lang="pl-PL" sz="1800" b="0" kern="1200" dirty="0" err="1" smtClean="0">
+                        <a:rPr lang="pl-PL" sz="1800" b="0" kern="1200" dirty="0" err="1">
                           <a:solidFill>
                             <a:schemeClr val="dk1"/>
                           </a:solidFill>
@@ -6224,7 +6283,7 @@
                         <a:t>EarlyStopping</a:t>
                       </a:r>
                       <a:r>
-                        <a:rPr lang="pl-PL" sz="1800" b="0" kern="1200" baseline="0" dirty="0" smtClean="0">
+                        <a:rPr lang="pl-PL" sz="1800" b="0" kern="1200" baseline="0" dirty="0">
                           <a:solidFill>
                             <a:schemeClr val="dk1"/>
                           </a:solidFill>
@@ -6236,7 +6295,7 @@
                         <a:t> -</a:t>
                       </a:r>
                       <a:r>
-                        <a:rPr lang="pl-PL" sz="1800" b="0" kern="1200" dirty="0" err="1" smtClean="0">
+                        <a:rPr lang="pl-PL" sz="1800" b="0" kern="1200" dirty="0" err="1">
                           <a:solidFill>
                             <a:schemeClr val="dk1"/>
                           </a:solidFill>
@@ -6248,7 +6307,7 @@
                         <a:t>patience</a:t>
                       </a:r>
                       <a:r>
-                        <a:rPr lang="pl-PL" sz="1800" b="0" kern="1200" dirty="0" smtClean="0">
+                        <a:rPr lang="pl-PL" sz="1800" b="0" kern="1200" dirty="0">
                           <a:solidFill>
                             <a:schemeClr val="dk1"/>
                           </a:solidFill>
@@ -6260,7 +6319,7 @@
                         <a:t>=10, </a:t>
                       </a:r>
                       <a:r>
-                        <a:rPr lang="pl-PL" sz="1800" b="0" kern="1200" dirty="0" err="1" smtClean="0">
+                        <a:rPr lang="pl-PL" sz="1800" b="0" kern="1200" dirty="0" err="1">
                           <a:solidFill>
                             <a:schemeClr val="dk1"/>
                           </a:solidFill>
@@ -6272,7 +6331,7 @@
                         <a:t>ReduceLROnPlateau</a:t>
                       </a:r>
                       <a:r>
-                        <a:rPr lang="pl-PL" sz="1800" b="0" kern="1200" dirty="0" smtClean="0">
+                        <a:rPr lang="pl-PL" sz="1800" b="0" kern="1200" dirty="0">
                           <a:solidFill>
                             <a:schemeClr val="dk1"/>
                           </a:solidFill>
@@ -6283,7 +6342,7 @@
                         </a:rPr>
                         <a:t>)</a:t>
                       </a:r>
-                      <a:endParaRPr lang="pl-PL" sz="1800" b="0" i="0" kern="1200" dirty="0" smtClean="0">
+                      <a:endParaRPr lang="pl-PL" sz="1800" b="0" i="0" kern="1200" dirty="0">
                         <a:solidFill>
                           <a:schemeClr val="dk1"/>
                         </a:solidFill>
@@ -6309,10 +6368,9 @@
                     <a:lstStyle/>
                     <a:p>
                       <a:r>
-                        <a:rPr lang="pl-PL" dirty="0" smtClean="0"/>
+                        <a:rPr lang="pl-PL" dirty="0"/>
                         <a:t>Model_5</a:t>
                       </a:r>
-                      <a:endParaRPr lang="pl-PL" dirty="0"/>
                     </a:p>
                   </a:txBody>
                   <a:tcPr/>
@@ -6323,10 +6381,9 @@
                     <a:lstStyle/>
                     <a:p>
                       <a:r>
-                        <a:rPr lang="pl-PL" dirty="0" smtClean="0"/>
+                        <a:rPr lang="pl-PL" dirty="0"/>
                         <a:t>0,9979</a:t>
                       </a:r>
-                      <a:endParaRPr lang="pl-PL" dirty="0"/>
                     </a:p>
                   </a:txBody>
                   <a:tcPr/>
@@ -6337,10 +6394,9 @@
                     <a:lstStyle/>
                     <a:p>
                       <a:r>
-                        <a:rPr lang="pl-PL" dirty="0" smtClean="0"/>
+                        <a:rPr lang="pl-PL" dirty="0"/>
                         <a:t>13</a:t>
                       </a:r>
-                      <a:endParaRPr lang="pl-PL" dirty="0"/>
                     </a:p>
                   </a:txBody>
                   <a:tcPr/>
@@ -6368,15 +6424,15 @@
                         <a:defRPr/>
                       </a:pPr>
                       <a:r>
-                        <a:rPr lang="pl-PL" dirty="0" err="1" smtClean="0"/>
+                        <a:rPr lang="pl-PL" dirty="0" err="1"/>
                         <a:t>Dropout</a:t>
                       </a:r>
                       <a:r>
-                        <a:rPr lang="pl-PL" dirty="0" smtClean="0"/>
+                        <a:rPr lang="pl-PL" dirty="0"/>
                         <a:t>, </a:t>
                       </a:r>
                       <a:r>
-                        <a:rPr lang="pl-PL" sz="1800" b="0" i="0" kern="1200" dirty="0" err="1" smtClean="0">
+                        <a:rPr lang="pl-PL" sz="1800" b="0" i="0" kern="1200" dirty="0" err="1">
                           <a:solidFill>
                             <a:schemeClr val="dk1"/>
                           </a:solidFill>
@@ -6388,7 +6444,7 @@
                         <a:t>BatchNormalization</a:t>
                       </a:r>
                       <a:r>
-                        <a:rPr lang="pl-PL" sz="1800" b="0" i="0" kern="1200" dirty="0" smtClean="0">
+                        <a:rPr lang="pl-PL" sz="1800" b="0" i="0" kern="1200" dirty="0">
                           <a:solidFill>
                             <a:schemeClr val="dk1"/>
                           </a:solidFill>
@@ -6400,7 +6456,7 @@
                         <a:t>,</a:t>
                       </a:r>
                       <a:r>
-                        <a:rPr lang="pl-PL" sz="1800" b="0" i="0" kern="1200" baseline="0" dirty="0" smtClean="0">
+                        <a:rPr lang="pl-PL" sz="1800" b="0" i="0" kern="1200" baseline="0" dirty="0">
                           <a:solidFill>
                             <a:schemeClr val="dk1"/>
                           </a:solidFill>
@@ -6412,7 +6468,7 @@
                         <a:t> </a:t>
                       </a:r>
                       <a:r>
-                        <a:rPr lang="pl-PL" sz="1800" b="0" i="0" kern="1200" baseline="0" dirty="0" err="1" smtClean="0">
+                        <a:rPr lang="pl-PL" sz="1800" b="0" i="0" kern="1200" baseline="0" dirty="0" err="1">
                           <a:solidFill>
                             <a:schemeClr val="dk1"/>
                           </a:solidFill>
@@ -6424,7 +6480,7 @@
                         <a:t>Callbacks</a:t>
                       </a:r>
                       <a:r>
-                        <a:rPr lang="pl-PL" sz="1800" b="0" i="0" kern="1200" baseline="0" dirty="0" smtClean="0">
+                        <a:rPr lang="pl-PL" sz="1800" b="0" i="0" kern="1200" baseline="0" dirty="0">
                           <a:solidFill>
                             <a:schemeClr val="dk1"/>
                           </a:solidFill>
@@ -6436,7 +6492,7 @@
                         <a:t> (</a:t>
                       </a:r>
                       <a:r>
-                        <a:rPr lang="pl-PL" sz="1800" b="0" kern="1200" dirty="0" err="1" smtClean="0">
+                        <a:rPr lang="pl-PL" sz="1800" b="0" kern="1200" dirty="0" err="1">
                           <a:solidFill>
                             <a:schemeClr val="dk1"/>
                           </a:solidFill>
@@ -6448,7 +6504,7 @@
                         <a:t>EarlyStopping</a:t>
                       </a:r>
                       <a:r>
-                        <a:rPr lang="pl-PL" sz="1800" b="0" kern="1200" baseline="0" dirty="0" smtClean="0">
+                        <a:rPr lang="pl-PL" sz="1800" b="0" kern="1200" baseline="0" dirty="0">
                           <a:solidFill>
                             <a:schemeClr val="dk1"/>
                           </a:solidFill>
@@ -6460,7 +6516,7 @@
                         <a:t> -</a:t>
                       </a:r>
                       <a:r>
-                        <a:rPr lang="pl-PL" sz="1800" b="0" kern="1200" dirty="0" err="1" smtClean="0">
+                        <a:rPr lang="pl-PL" sz="1800" b="0" kern="1200" dirty="0" err="1">
                           <a:solidFill>
                             <a:schemeClr val="dk1"/>
                           </a:solidFill>
@@ -6472,7 +6528,7 @@
                         <a:t>patience</a:t>
                       </a:r>
                       <a:r>
-                        <a:rPr lang="pl-PL" sz="1800" b="0" kern="1200" dirty="0" smtClean="0">
+                        <a:rPr lang="pl-PL" sz="1800" b="0" kern="1200" dirty="0">
                           <a:solidFill>
                             <a:schemeClr val="dk1"/>
                           </a:solidFill>
@@ -6484,7 +6540,7 @@
                         <a:t>=10, </a:t>
                       </a:r>
                       <a:r>
-                        <a:rPr lang="pl-PL" sz="1800" b="0" kern="1200" dirty="0" err="1" smtClean="0">
+                        <a:rPr lang="pl-PL" sz="1800" b="0" kern="1200" dirty="0" err="1">
                           <a:solidFill>
                             <a:schemeClr val="dk1"/>
                           </a:solidFill>
@@ -6496,7 +6552,7 @@
                         <a:t>ReduceLROnPlateau</a:t>
                       </a:r>
                       <a:r>
-                        <a:rPr lang="pl-PL" sz="1800" b="0" kern="1200" dirty="0" smtClean="0">
+                        <a:rPr lang="pl-PL" sz="1800" b="0" kern="1200" dirty="0">
                           <a:solidFill>
                             <a:schemeClr val="dk1"/>
                           </a:solidFill>
@@ -6507,7 +6563,7 @@
                         </a:rPr>
                         <a:t>), augmentacja</a:t>
                       </a:r>
-                      <a:endParaRPr lang="pl-PL" sz="1800" b="0" i="0" kern="1200" dirty="0" smtClean="0">
+                      <a:endParaRPr lang="pl-PL" sz="1800" b="0" i="0" kern="1200" dirty="0">
                         <a:solidFill>
                           <a:schemeClr val="dk1"/>
                         </a:solidFill>
@@ -6543,13 +6599,6 @@
   <p:clrMapOvr>
     <a:masterClrMapping/>
   </p:clrMapOvr>
-  <p:timing>
-    <p:tnLst>
-      <p:par>
-        <p:cTn id="1" dur="indefinite" restart="never" nodeType="tmRoot"/>
-      </p:par>
-    </p:tnLst>
-  </p:timing>
 </p:sld>
 </file>
 
@@ -6708,13 +6757,6 @@
   <p:clrMapOvr>
     <a:masterClrMapping/>
   </p:clrMapOvr>
-  <p:timing>
-    <p:tnLst>
-      <p:par>
-        <p:cTn id="1" dur="indefinite" restart="never" nodeType="tmRoot"/>
-      </p:par>
-    </p:tnLst>
-  </p:timing>
 </p:sld>
 </file>
 

</xml_diff>

<commit_message>
poprawki labele wykresy confusion matrix
</commit_message>
<xml_diff>
--- a/projekt_dl/SIGN LANGAUGE MNIST.pptx
+++ b/projekt_dl/SIGN LANGAUGE MNIST.pptx
@@ -275,7 +275,7 @@
           <a:p>
             <a:fld id="{203E222E-0805-4CAD-B87C-507E4F056BAA}" type="datetimeFigureOut">
               <a:rPr lang="pl-PL" smtClean="0"/>
-              <a:t>20.10.2022</a:t>
+              <a:t>22.10.2022</a:t>
             </a:fld>
             <a:endParaRPr lang="pl-PL"/>
           </a:p>
@@ -473,7 +473,7 @@
           <a:p>
             <a:fld id="{203E222E-0805-4CAD-B87C-507E4F056BAA}" type="datetimeFigureOut">
               <a:rPr lang="pl-PL" smtClean="0"/>
-              <a:t>20.10.2022</a:t>
+              <a:t>22.10.2022</a:t>
             </a:fld>
             <a:endParaRPr lang="pl-PL"/>
           </a:p>
@@ -681,7 +681,7 @@
           <a:p>
             <a:fld id="{203E222E-0805-4CAD-B87C-507E4F056BAA}" type="datetimeFigureOut">
               <a:rPr lang="pl-PL" smtClean="0"/>
-              <a:t>20.10.2022</a:t>
+              <a:t>22.10.2022</a:t>
             </a:fld>
             <a:endParaRPr lang="pl-PL"/>
           </a:p>
@@ -879,7 +879,7 @@
           <a:p>
             <a:fld id="{203E222E-0805-4CAD-B87C-507E4F056BAA}" type="datetimeFigureOut">
               <a:rPr lang="pl-PL" smtClean="0"/>
-              <a:t>20.10.2022</a:t>
+              <a:t>22.10.2022</a:t>
             </a:fld>
             <a:endParaRPr lang="pl-PL"/>
           </a:p>
@@ -1154,7 +1154,7 @@
           <a:p>
             <a:fld id="{203E222E-0805-4CAD-B87C-507E4F056BAA}" type="datetimeFigureOut">
               <a:rPr lang="pl-PL" smtClean="0"/>
-              <a:t>20.10.2022</a:t>
+              <a:t>22.10.2022</a:t>
             </a:fld>
             <a:endParaRPr lang="pl-PL"/>
           </a:p>
@@ -1419,7 +1419,7 @@
           <a:p>
             <a:fld id="{203E222E-0805-4CAD-B87C-507E4F056BAA}" type="datetimeFigureOut">
               <a:rPr lang="pl-PL" smtClean="0"/>
-              <a:t>20.10.2022</a:t>
+              <a:t>22.10.2022</a:t>
             </a:fld>
             <a:endParaRPr lang="pl-PL"/>
           </a:p>
@@ -1831,7 +1831,7 @@
           <a:p>
             <a:fld id="{203E222E-0805-4CAD-B87C-507E4F056BAA}" type="datetimeFigureOut">
               <a:rPr lang="pl-PL" smtClean="0"/>
-              <a:t>20.10.2022</a:t>
+              <a:t>22.10.2022</a:t>
             </a:fld>
             <a:endParaRPr lang="pl-PL"/>
           </a:p>
@@ -1972,7 +1972,7 @@
           <a:p>
             <a:fld id="{203E222E-0805-4CAD-B87C-507E4F056BAA}" type="datetimeFigureOut">
               <a:rPr lang="pl-PL" smtClean="0"/>
-              <a:t>20.10.2022</a:t>
+              <a:t>22.10.2022</a:t>
             </a:fld>
             <a:endParaRPr lang="pl-PL"/>
           </a:p>
@@ -2085,7 +2085,7 @@
           <a:p>
             <a:fld id="{203E222E-0805-4CAD-B87C-507E4F056BAA}" type="datetimeFigureOut">
               <a:rPr lang="pl-PL" smtClean="0"/>
-              <a:t>20.10.2022</a:t>
+              <a:t>22.10.2022</a:t>
             </a:fld>
             <a:endParaRPr lang="pl-PL"/>
           </a:p>
@@ -2396,7 +2396,7 @@
           <a:p>
             <a:fld id="{203E222E-0805-4CAD-B87C-507E4F056BAA}" type="datetimeFigureOut">
               <a:rPr lang="pl-PL" smtClean="0"/>
-              <a:t>20.10.2022</a:t>
+              <a:t>22.10.2022</a:t>
             </a:fld>
             <a:endParaRPr lang="pl-PL"/>
           </a:p>
@@ -2684,7 +2684,7 @@
           <a:p>
             <a:fld id="{203E222E-0805-4CAD-B87C-507E4F056BAA}" type="datetimeFigureOut">
               <a:rPr lang="pl-PL" smtClean="0"/>
-              <a:t>20.10.2022</a:t>
+              <a:t>22.10.2022</a:t>
             </a:fld>
             <a:endParaRPr lang="pl-PL"/>
           </a:p>
@@ -2925,7 +2925,7 @@
           <a:p>
             <a:fld id="{203E222E-0805-4CAD-B87C-507E4F056BAA}" type="datetimeFigureOut">
               <a:rPr lang="pl-PL" smtClean="0"/>
-              <a:t>20.10.2022</a:t>
+              <a:t>22.10.2022</a:t>
             </a:fld>
             <a:endParaRPr lang="pl-PL"/>
           </a:p>
@@ -3953,7 +3953,7 @@
         </p:nvSpPr>
         <p:spPr>
           <a:xfrm>
-            <a:off x="838200" y="365125"/>
+            <a:off x="1609987" y="308590"/>
             <a:ext cx="8671560" cy="823595"/>
           </a:xfrm>
           <a:solidFill>
@@ -3996,15 +3996,20 @@
           </p:nvPr>
         </p:nvPicPr>
         <p:blipFill>
-          <a:blip r:embed="rId2"/>
-          <a:stretch>
-            <a:fillRect/>
-          </a:stretch>
+          <a:blip r:embed="rId2">
+            <a:extLst>
+              <a:ext uri="{28A0092B-C50C-407E-A947-70E740481C1C}">
+                <a14:useLocalDpi xmlns:a14="http://schemas.microsoft.com/office/drawing/2010/main" val="0"/>
+              </a:ext>
+            </a:extLst>
+          </a:blip>
+          <a:srcRect/>
+          <a:stretch/>
         </p:blipFill>
         <p:spPr>
           <a:xfrm>
-            <a:off x="2808317" y="1532746"/>
-            <a:ext cx="5338156" cy="4837834"/>
+            <a:off x="2961315" y="1532746"/>
+            <a:ext cx="5931016" cy="5016664"/>
           </a:xfrm>
         </p:spPr>
       </p:pic>
@@ -4097,15 +4102,20 @@
           <p:nvPr/>
         </p:nvPicPr>
         <p:blipFill>
-          <a:blip r:embed="rId2"/>
-          <a:stretch>
-            <a:fillRect/>
-          </a:stretch>
+          <a:blip r:embed="rId2">
+            <a:extLst>
+              <a:ext uri="{28A0092B-C50C-407E-A947-70E740481C1C}">
+                <a14:useLocalDpi xmlns:a14="http://schemas.microsoft.com/office/drawing/2010/main" val="0"/>
+              </a:ext>
+            </a:extLst>
+          </a:blip>
+          <a:srcRect/>
+          <a:stretch/>
         </p:blipFill>
         <p:spPr>
           <a:xfrm>
-            <a:off x="2581275" y="1285875"/>
-            <a:ext cx="6420329" cy="5415425"/>
+            <a:off x="2801923" y="1285875"/>
+            <a:ext cx="6115574" cy="5415425"/>
           </a:xfrm>
           <a:prstGeom prst="rect">
             <a:avLst/>
@@ -5091,14 +5101,12 @@
             </a:extLst>
           </a:blip>
           <a:srcRect/>
-          <a:stretch>
-            <a:fillRect/>
-          </a:stretch>
+          <a:stretch/>
         </p:blipFill>
         <p:spPr bwMode="auto">
           <a:xfrm>
-            <a:off x="4467225" y="2219325"/>
-            <a:ext cx="6972299" cy="4273549"/>
+            <a:off x="4848837" y="2219325"/>
+            <a:ext cx="6504963" cy="4273549"/>
           </a:xfrm>
           <a:prstGeom prst="rect">
             <a:avLst/>

</xml_diff>